<commit_message>
Update Web Design Assignment.pptx
</commit_message>
<xml_diff>
--- a/Web Design Assignment.pptx
+++ b/Web Design Assignment.pptx
@@ -7,9 +7,12 @@
   <p:sldIdLst>
     <p:sldId id="256" r:id="rId2"/>
     <p:sldId id="257" r:id="rId3"/>
-    <p:sldId id="258" r:id="rId4"/>
-    <p:sldId id="259" r:id="rId5"/>
-    <p:sldId id="261" r:id="rId6"/>
+    <p:sldId id="262" r:id="rId4"/>
+    <p:sldId id="258" r:id="rId5"/>
+    <p:sldId id="263" r:id="rId6"/>
+    <p:sldId id="259" r:id="rId7"/>
+    <p:sldId id="261" r:id="rId8"/>
+    <p:sldId id="264" r:id="rId9"/>
   </p:sldIdLst>
   <p:sldSz cx="12192000" cy="6858000"/>
   <p:notesSz cx="6858000" cy="9144000"/>
@@ -108,6 +111,11 @@
       </a:defRPr>
     </a:lvl9pPr>
   </p:defaultTextStyle>
+  <p:extLst>
+    <p:ext uri="{EFAFB233-063F-42B5-8137-9DF3F51BA10A}">
+      <p15:sldGuideLst xmlns:p15="http://schemas.microsoft.com/office/powerpoint/2012/main"/>
+    </p:ext>
+  </p:extLst>
 </p:presentation>
 </file>
 
@@ -258,7 +266,7 @@
           <a:p>
             <a:fld id="{9C612ED0-1C98-4509-8D12-37F7071BE828}" type="datetimeFigureOut">
               <a:rPr lang="en-US" smtClean="0"/>
-              <a:t>11/19/2024</a:t>
+              <a:t>11/26/2024</a:t>
             </a:fld>
             <a:endParaRPr lang="en-US"/>
           </a:p>
@@ -456,7 +464,7 @@
           <a:p>
             <a:fld id="{9C612ED0-1C98-4509-8D12-37F7071BE828}" type="datetimeFigureOut">
               <a:rPr lang="en-US" smtClean="0"/>
-              <a:t>11/19/2024</a:t>
+              <a:t>11/26/2024</a:t>
             </a:fld>
             <a:endParaRPr lang="en-US"/>
           </a:p>
@@ -664,7 +672,7 @@
           <a:p>
             <a:fld id="{9C612ED0-1C98-4509-8D12-37F7071BE828}" type="datetimeFigureOut">
               <a:rPr lang="en-US" smtClean="0"/>
-              <a:t>11/19/2024</a:t>
+              <a:t>11/26/2024</a:t>
             </a:fld>
             <a:endParaRPr lang="en-US"/>
           </a:p>
@@ -862,7 +870,7 @@
           <a:p>
             <a:fld id="{9C612ED0-1C98-4509-8D12-37F7071BE828}" type="datetimeFigureOut">
               <a:rPr lang="en-US" smtClean="0"/>
-              <a:t>11/19/2024</a:t>
+              <a:t>11/26/2024</a:t>
             </a:fld>
             <a:endParaRPr lang="en-US"/>
           </a:p>
@@ -1137,7 +1145,7 @@
           <a:p>
             <a:fld id="{9C612ED0-1C98-4509-8D12-37F7071BE828}" type="datetimeFigureOut">
               <a:rPr lang="en-US" smtClean="0"/>
-              <a:t>11/19/2024</a:t>
+              <a:t>11/26/2024</a:t>
             </a:fld>
             <a:endParaRPr lang="en-US"/>
           </a:p>
@@ -1402,7 +1410,7 @@
           <a:p>
             <a:fld id="{9C612ED0-1C98-4509-8D12-37F7071BE828}" type="datetimeFigureOut">
               <a:rPr lang="en-US" smtClean="0"/>
-              <a:t>11/19/2024</a:t>
+              <a:t>11/26/2024</a:t>
             </a:fld>
             <a:endParaRPr lang="en-US"/>
           </a:p>
@@ -1814,7 +1822,7 @@
           <a:p>
             <a:fld id="{9C612ED0-1C98-4509-8D12-37F7071BE828}" type="datetimeFigureOut">
               <a:rPr lang="en-US" smtClean="0"/>
-              <a:t>11/19/2024</a:t>
+              <a:t>11/26/2024</a:t>
             </a:fld>
             <a:endParaRPr lang="en-US"/>
           </a:p>
@@ -1955,7 +1963,7 @@
           <a:p>
             <a:fld id="{9C612ED0-1C98-4509-8D12-37F7071BE828}" type="datetimeFigureOut">
               <a:rPr lang="en-US" smtClean="0"/>
-              <a:t>11/19/2024</a:t>
+              <a:t>11/26/2024</a:t>
             </a:fld>
             <a:endParaRPr lang="en-US"/>
           </a:p>
@@ -2068,7 +2076,7 @@
           <a:p>
             <a:fld id="{9C612ED0-1C98-4509-8D12-37F7071BE828}" type="datetimeFigureOut">
               <a:rPr lang="en-US" smtClean="0"/>
-              <a:t>11/19/2024</a:t>
+              <a:t>11/26/2024</a:t>
             </a:fld>
             <a:endParaRPr lang="en-US"/>
           </a:p>
@@ -2379,7 +2387,7 @@
           <a:p>
             <a:fld id="{9C612ED0-1C98-4509-8D12-37F7071BE828}" type="datetimeFigureOut">
               <a:rPr lang="en-US" smtClean="0"/>
-              <a:t>11/19/2024</a:t>
+              <a:t>11/26/2024</a:t>
             </a:fld>
             <a:endParaRPr lang="en-US"/>
           </a:p>
@@ -2667,7 +2675,7 @@
           <a:p>
             <a:fld id="{9C612ED0-1C98-4509-8D12-37F7071BE828}" type="datetimeFigureOut">
               <a:rPr lang="en-US" smtClean="0"/>
-              <a:t>11/19/2024</a:t>
+              <a:t>11/26/2024</a:t>
             </a:fld>
             <a:endParaRPr lang="en-US"/>
           </a:p>
@@ -2908,7 +2916,7 @@
           <a:p>
             <a:fld id="{9C612ED0-1C98-4509-8D12-37F7071BE828}" type="datetimeFigureOut">
               <a:rPr lang="en-US" smtClean="0"/>
-              <a:t>11/19/2024</a:t>
+              <a:t>11/26/2024</a:t>
             </a:fld>
             <a:endParaRPr lang="en-US"/>
           </a:p>
@@ -3839,6 +3847,457 @@
           <p:cNvPr id="2" name="Title 1">
             <a:extLst>
               <a:ext uri="{FF2B5EF4-FFF2-40B4-BE49-F238E27FC236}">
+                <a16:creationId xmlns:a16="http://schemas.microsoft.com/office/drawing/2014/main" id="{469A2BE6-A98D-45B7-4077-68E1EF833FB1}"/>
+              </a:ext>
+            </a:extLst>
+          </p:cNvPr>
+          <p:cNvSpPr>
+            <a:spLocks noGrp="1"/>
+          </p:cNvSpPr>
+          <p:nvPr>
+            <p:ph type="title"/>
+          </p:nvPr>
+        </p:nvSpPr>
+        <p:spPr/>
+        <p:txBody>
+          <a:bodyPr/>
+          <a:lstStyle/>
+          <a:p>
+            <a:r>
+              <a:rPr lang="en-US" dirty="0"/>
+              <a:t>Technology Stack</a:t>
+            </a:r>
+          </a:p>
+        </p:txBody>
+      </p:sp>
+      <p:sp>
+        <p:nvSpPr>
+          <p:cNvPr id="18" name="Rectangle 15">
+            <a:extLst>
+              <a:ext uri="{FF2B5EF4-FFF2-40B4-BE49-F238E27FC236}">
+                <a16:creationId xmlns:a16="http://schemas.microsoft.com/office/drawing/2014/main" id="{9BA4477B-A83C-051F-591D-7D997880BB60}"/>
+              </a:ext>
+            </a:extLst>
+          </p:cNvPr>
+          <p:cNvSpPr>
+            <a:spLocks noGrp="1" noChangeArrowheads="1"/>
+          </p:cNvSpPr>
+          <p:nvPr>
+            <p:ph idx="1"/>
+          </p:nvPr>
+        </p:nvSpPr>
+        <p:spPr bwMode="auto">
+          <a:xfrm>
+            <a:off x="816991" y="2062164"/>
+            <a:ext cx="4528997" cy="3046988"/>
+          </a:xfrm>
+          <a:prstGeom prst="rect">
+            <a:avLst/>
+          </a:prstGeom>
+          <a:noFill/>
+          <a:ln>
+            <a:noFill/>
+          </a:ln>
+          <a:effectLst/>
+          <a:extLst>
+            <a:ext uri="{909E8E84-426E-40DD-AFC4-6F175D3DCCD1}">
+              <a14:hiddenFill xmlns:a14="http://schemas.microsoft.com/office/drawing/2010/main">
+                <a:solidFill>
+                  <a:schemeClr val="accent1"/>
+                </a:solidFill>
+              </a14:hiddenFill>
+            </a:ext>
+            <a:ext uri="{91240B29-F687-4F45-9708-019B960494DF}">
+              <a14:hiddenLine xmlns:a14="http://schemas.microsoft.com/office/drawing/2010/main" w="9525">
+                <a:solidFill>
+                  <a:schemeClr val="tx1"/>
+                </a:solidFill>
+                <a:miter lim="800000"/>
+                <a:headEnd/>
+                <a:tailEnd/>
+              </a14:hiddenLine>
+            </a:ext>
+            <a:ext uri="{AF507438-7753-43E0-B8FC-AC1667EBCBE1}">
+              <a14:hiddenEffects xmlns:a14="http://schemas.microsoft.com/office/drawing/2010/main">
+                <a:effectLst>
+                  <a:outerShdw dist="35921" dir="2700000" algn="ctr" rotWithShape="0">
+                    <a:schemeClr val="bg2"/>
+                  </a:outerShdw>
+                </a:effectLst>
+              </a14:hiddenEffects>
+            </a:ext>
+          </a:extLst>
+        </p:spPr>
+        <p:txBody>
+          <a:bodyPr vert="horz" wrap="none" lIns="91440" tIns="45720" rIns="91440" bIns="45720" numCol="1" anchor="ctr" anchorCtr="0" compatLnSpc="1">
+            <a:prstTxWarp prst="textNoShape">
+              <a:avLst/>
+            </a:prstTxWarp>
+            <a:spAutoFit/>
+          </a:bodyPr>
+          <a:lstStyle/>
+          <a:p>
+            <a:pPr marL="0" marR="0" lvl="0" indent="0" algn="l" defTabSz="914400" rtl="0" eaLnBrk="0" fontAlgn="base" latinLnBrk="0" hangingPunct="0">
+              <a:lnSpc>
+                <a:spcPct val="100000"/>
+              </a:lnSpc>
+              <a:spcBef>
+                <a:spcPct val="0"/>
+              </a:spcBef>
+              <a:spcAft>
+                <a:spcPct val="0"/>
+              </a:spcAft>
+              <a:buClrTx/>
+              <a:buSzTx/>
+              <a:buNone/>
+              <a:tabLst/>
+            </a:pPr>
+            <a:r>
+              <a:rPr kumimoji="0" lang="en-US" altLang="en-US" sz="2400" b="1" i="0" u="sng" strike="noStrike" cap="none" normalizeH="0" baseline="0" dirty="0">
+                <a:ln>
+                  <a:noFill/>
+                </a:ln>
+                <a:solidFill>
+                  <a:schemeClr val="tx1"/>
+                </a:solidFill>
+                <a:effectLst/>
+                <a:latin typeface="+mj-lt"/>
+              </a:rPr>
+              <a:t>Languages</a:t>
+            </a:r>
+            <a:endParaRPr kumimoji="0" lang="en-US" altLang="en-US" sz="2400" b="0" i="0" u="sng" strike="noStrike" cap="none" normalizeH="0" baseline="0" dirty="0">
+              <a:ln>
+                <a:noFill/>
+              </a:ln>
+              <a:solidFill>
+                <a:schemeClr val="tx1"/>
+              </a:solidFill>
+              <a:effectLst/>
+              <a:latin typeface="+mj-lt"/>
+            </a:endParaRPr>
+          </a:p>
+          <a:p>
+            <a:pPr marL="0" marR="0" lvl="0" indent="0" algn="l" defTabSz="914400" rtl="0" eaLnBrk="0" fontAlgn="base" latinLnBrk="0" hangingPunct="0">
+              <a:lnSpc>
+                <a:spcPct val="100000"/>
+              </a:lnSpc>
+              <a:spcBef>
+                <a:spcPct val="0"/>
+              </a:spcBef>
+              <a:spcAft>
+                <a:spcPct val="0"/>
+              </a:spcAft>
+              <a:buClrTx/>
+              <a:buSzTx/>
+              <a:buNone/>
+              <a:tabLst/>
+            </a:pPr>
+            <a:r>
+              <a:rPr kumimoji="0" lang="en-US" altLang="en-US" sz="2400" b="0" i="0" u="none" strike="noStrike" cap="none" normalizeH="0" baseline="0" dirty="0">
+                <a:ln>
+                  <a:noFill/>
+                </a:ln>
+                <a:solidFill>
+                  <a:schemeClr val="tx1"/>
+                </a:solidFill>
+                <a:effectLst/>
+                <a:latin typeface="+mj-lt"/>
+              </a:rPr>
+              <a:t> HTML, CSS, JavaScript.</a:t>
+            </a:r>
+          </a:p>
+          <a:p>
+            <a:pPr marL="0" marR="0" lvl="0" indent="0" algn="l" defTabSz="914400" rtl="0" eaLnBrk="0" fontAlgn="base" latinLnBrk="0" hangingPunct="0">
+              <a:lnSpc>
+                <a:spcPct val="100000"/>
+              </a:lnSpc>
+              <a:spcBef>
+                <a:spcPct val="0"/>
+              </a:spcBef>
+              <a:spcAft>
+                <a:spcPct val="0"/>
+              </a:spcAft>
+              <a:buClrTx/>
+              <a:buSzTx/>
+              <a:buNone/>
+              <a:tabLst/>
+            </a:pPr>
+            <a:endParaRPr kumimoji="0" lang="en-US" altLang="en-US" sz="2400" b="0" i="0" u="none" strike="noStrike" cap="none" normalizeH="0" baseline="0" dirty="0">
+              <a:ln>
+                <a:noFill/>
+              </a:ln>
+              <a:solidFill>
+                <a:schemeClr val="tx1"/>
+              </a:solidFill>
+              <a:effectLst/>
+              <a:latin typeface="+mj-lt"/>
+            </a:endParaRPr>
+          </a:p>
+          <a:p>
+            <a:pPr marL="0" marR="0" lvl="0" indent="0" algn="l" defTabSz="914400" rtl="0" eaLnBrk="0" fontAlgn="base" latinLnBrk="0" hangingPunct="0">
+              <a:lnSpc>
+                <a:spcPct val="100000"/>
+              </a:lnSpc>
+              <a:spcBef>
+                <a:spcPct val="0"/>
+              </a:spcBef>
+              <a:spcAft>
+                <a:spcPct val="0"/>
+              </a:spcAft>
+              <a:buClrTx/>
+              <a:buSzTx/>
+              <a:buNone/>
+              <a:tabLst/>
+            </a:pPr>
+            <a:r>
+              <a:rPr kumimoji="0" lang="en-US" altLang="en-US" sz="2400" b="1" i="0" u="sng" strike="noStrike" cap="none" normalizeH="0" baseline="0" dirty="0">
+                <a:ln>
+                  <a:noFill/>
+                </a:ln>
+                <a:solidFill>
+                  <a:schemeClr val="tx1"/>
+                </a:solidFill>
+                <a:effectLst/>
+                <a:latin typeface="+mj-lt"/>
+              </a:rPr>
+              <a:t>Libraries &amp; Frameworks</a:t>
+            </a:r>
+            <a:endParaRPr kumimoji="0" lang="en-US" altLang="en-US" sz="2400" b="0" i="0" u="sng" strike="noStrike" cap="none" normalizeH="0" baseline="0" dirty="0">
+              <a:ln>
+                <a:noFill/>
+              </a:ln>
+              <a:solidFill>
+                <a:schemeClr val="tx1"/>
+              </a:solidFill>
+              <a:effectLst/>
+              <a:latin typeface="+mj-lt"/>
+            </a:endParaRPr>
+          </a:p>
+          <a:p>
+            <a:pPr marL="0" marR="0" lvl="0" indent="0" algn="l" defTabSz="914400" rtl="0" eaLnBrk="0" fontAlgn="base" latinLnBrk="0" hangingPunct="0">
+              <a:lnSpc>
+                <a:spcPct val="100000"/>
+              </a:lnSpc>
+              <a:spcBef>
+                <a:spcPct val="0"/>
+              </a:spcBef>
+              <a:spcAft>
+                <a:spcPct val="0"/>
+              </a:spcAft>
+              <a:buClrTx/>
+              <a:buSzTx/>
+              <a:buNone/>
+              <a:tabLst/>
+            </a:pPr>
+            <a:r>
+              <a:rPr kumimoji="0" lang="en-US" altLang="en-US" sz="2400" b="0" i="0" u="none" strike="noStrike" cap="none" normalizeH="0" baseline="0" dirty="0">
+                <a:ln>
+                  <a:noFill/>
+                </a:ln>
+                <a:solidFill>
+                  <a:schemeClr val="tx1"/>
+                </a:solidFill>
+                <a:effectLst/>
+                <a:latin typeface="+mj-lt"/>
+              </a:rPr>
+              <a:t> </a:t>
+            </a:r>
+            <a:r>
+              <a:rPr kumimoji="0" lang="en-US" altLang="en-US" sz="2400" b="0" i="0" u="none" strike="noStrike" cap="none" normalizeH="0" baseline="0" dirty="0" err="1">
+                <a:ln>
+                  <a:noFill/>
+                </a:ln>
+                <a:solidFill>
+                  <a:schemeClr val="tx1"/>
+                </a:solidFill>
+                <a:effectLst/>
+                <a:latin typeface="+mj-lt"/>
+              </a:rPr>
+              <a:t>Chart.js</a:t>
+            </a:r>
+            <a:r>
+              <a:rPr kumimoji="0" lang="en-US" altLang="en-US" sz="2400" b="0" i="0" u="none" strike="noStrike" cap="none" normalizeH="0" baseline="0" dirty="0">
+                <a:ln>
+                  <a:noFill/>
+                </a:ln>
+                <a:solidFill>
+                  <a:schemeClr val="tx1"/>
+                </a:solidFill>
+                <a:effectLst/>
+                <a:latin typeface="+mj-lt"/>
+              </a:rPr>
+              <a:t> for data visualization.</a:t>
+            </a:r>
+          </a:p>
+          <a:p>
+            <a:pPr marL="0" marR="0" lvl="0" indent="0" algn="l" defTabSz="914400" rtl="0" eaLnBrk="0" fontAlgn="base" latinLnBrk="0" hangingPunct="0">
+              <a:lnSpc>
+                <a:spcPct val="100000"/>
+              </a:lnSpc>
+              <a:spcBef>
+                <a:spcPct val="0"/>
+              </a:spcBef>
+              <a:spcAft>
+                <a:spcPct val="0"/>
+              </a:spcAft>
+              <a:buClrTx/>
+              <a:buSzTx/>
+              <a:buNone/>
+              <a:tabLst/>
+            </a:pPr>
+            <a:endParaRPr kumimoji="0" lang="en-US" altLang="en-US" sz="2400" b="0" i="0" u="none" strike="noStrike" cap="none" normalizeH="0" baseline="0" dirty="0">
+              <a:ln>
+                <a:noFill/>
+              </a:ln>
+              <a:solidFill>
+                <a:schemeClr val="tx1"/>
+              </a:solidFill>
+              <a:effectLst/>
+              <a:latin typeface="+mj-lt"/>
+            </a:endParaRPr>
+          </a:p>
+          <a:p>
+            <a:pPr marL="0" marR="0" lvl="0" indent="0" algn="l" defTabSz="914400" rtl="0" eaLnBrk="0" fontAlgn="base" latinLnBrk="0" hangingPunct="0">
+              <a:lnSpc>
+                <a:spcPct val="100000"/>
+              </a:lnSpc>
+              <a:spcBef>
+                <a:spcPct val="0"/>
+              </a:spcBef>
+              <a:spcAft>
+                <a:spcPct val="0"/>
+              </a:spcAft>
+              <a:buClrTx/>
+              <a:buSzTx/>
+              <a:buNone/>
+              <a:tabLst/>
+            </a:pPr>
+            <a:r>
+              <a:rPr kumimoji="0" lang="en-US" altLang="en-US" sz="2400" b="1" i="0" u="sng" strike="noStrike" cap="none" normalizeH="0" baseline="0" dirty="0">
+                <a:ln>
+                  <a:noFill/>
+                </a:ln>
+                <a:solidFill>
+                  <a:schemeClr val="tx1"/>
+                </a:solidFill>
+                <a:effectLst/>
+                <a:latin typeface="+mj-lt"/>
+              </a:rPr>
+              <a:t>APIs</a:t>
+            </a:r>
+            <a:r>
+              <a:rPr kumimoji="0" lang="en-US" altLang="en-US" sz="2400" b="0" i="0" u="sng" strike="noStrike" cap="none" normalizeH="0" baseline="0" dirty="0">
+                <a:ln>
+                  <a:noFill/>
+                </a:ln>
+                <a:solidFill>
+                  <a:schemeClr val="tx1"/>
+                </a:solidFill>
+                <a:effectLst/>
+                <a:latin typeface="+mj-lt"/>
+              </a:rPr>
+              <a:t> </a:t>
+            </a:r>
+            <a:r>
+              <a:rPr kumimoji="0" lang="en-US" altLang="en-US" sz="2400" b="0" i="0" u="none" strike="noStrike" cap="none" normalizeH="0" baseline="0" dirty="0">
+                <a:ln>
+                  <a:noFill/>
+                </a:ln>
+                <a:solidFill>
+                  <a:schemeClr val="tx1"/>
+                </a:solidFill>
+                <a:effectLst/>
+                <a:latin typeface="+mj-lt"/>
+              </a:rPr>
+              <a:t>(</a:t>
+            </a:r>
+            <a:r>
+              <a:rPr lang="en-US" altLang="en-US" sz="2400" dirty="0">
+                <a:latin typeface="+mj-lt"/>
+              </a:rPr>
+              <a:t>will be used</a:t>
+            </a:r>
+            <a:r>
+              <a:rPr kumimoji="0" lang="en-US" altLang="en-US" sz="2400" b="0" i="0" u="none" strike="noStrike" cap="none" normalizeH="0" baseline="0" dirty="0">
+                <a:ln>
+                  <a:noFill/>
+                </a:ln>
+                <a:solidFill>
+                  <a:schemeClr val="tx1"/>
+                </a:solidFill>
+                <a:effectLst/>
+                <a:latin typeface="+mj-lt"/>
+              </a:rPr>
+              <a:t>)</a:t>
+            </a:r>
+          </a:p>
+          <a:p>
+            <a:pPr marL="0" marR="0" lvl="0" indent="0" algn="l" defTabSz="914400" rtl="0" eaLnBrk="0" fontAlgn="base" latinLnBrk="0" hangingPunct="0">
+              <a:lnSpc>
+                <a:spcPct val="100000"/>
+              </a:lnSpc>
+              <a:spcBef>
+                <a:spcPct val="0"/>
+              </a:spcBef>
+              <a:spcAft>
+                <a:spcPct val="0"/>
+              </a:spcAft>
+              <a:buClrTx/>
+              <a:buSzTx/>
+              <a:buNone/>
+              <a:tabLst/>
+            </a:pPr>
+            <a:r>
+              <a:rPr kumimoji="0" lang="en-US" altLang="en-US" sz="2400" b="0" i="0" u="none" strike="noStrike" cap="none" normalizeH="0" baseline="0" dirty="0">
+                <a:ln>
+                  <a:noFill/>
+                </a:ln>
+                <a:solidFill>
+                  <a:schemeClr val="tx1"/>
+                </a:solidFill>
+                <a:effectLst/>
+                <a:latin typeface="+mj-lt"/>
+              </a:rPr>
+              <a:t> Placeholder for future integration. </a:t>
+            </a:r>
+          </a:p>
+        </p:txBody>
+      </p:sp>
+    </p:spTree>
+    <p:extLst>
+      <p:ext uri="{BB962C8B-B14F-4D97-AF65-F5344CB8AC3E}">
+        <p14:creationId xmlns:p14="http://schemas.microsoft.com/office/powerpoint/2010/main" val="2973458382"/>
+      </p:ext>
+    </p:extLst>
+  </p:cSld>
+  <p:clrMapOvr>
+    <a:masterClrMapping/>
+  </p:clrMapOvr>
+</p:sld>
+</file>
+
+<file path=ppt/slides/slide4.xml><?xml version="1.0" encoding="utf-8"?>
+<p:sld xmlns:a="http://schemas.openxmlformats.org/drawingml/2006/main" xmlns:r="http://schemas.openxmlformats.org/officeDocument/2006/relationships" xmlns:p="http://schemas.openxmlformats.org/presentationml/2006/main">
+  <p:cSld>
+    <p:spTree>
+      <p:nvGrpSpPr>
+        <p:cNvPr id="1" name=""/>
+        <p:cNvGrpSpPr/>
+        <p:nvPr/>
+      </p:nvGrpSpPr>
+      <p:grpSpPr>
+        <a:xfrm>
+          <a:off x="0" y="0"/>
+          <a:ext cx="0" cy="0"/>
+          <a:chOff x="0" y="0"/>
+          <a:chExt cx="0" cy="0"/>
+        </a:xfrm>
+      </p:grpSpPr>
+      <p:sp>
+        <p:nvSpPr>
+          <p:cNvPr id="2" name="Title 1">
+            <a:extLst>
+              <a:ext uri="{FF2B5EF4-FFF2-40B4-BE49-F238E27FC236}">
                 <a16:creationId xmlns:a16="http://schemas.microsoft.com/office/drawing/2014/main" id="{51AB92E1-EB7E-4A37-C72F-2E1D96DF85D8}"/>
               </a:ext>
             </a:extLst>
@@ -4100,7 +4559,153 @@
 </p:sld>
 </file>
 
-<file path=ppt/slides/slide4.xml><?xml version="1.0" encoding="utf-8"?>
+<file path=ppt/slides/slide5.xml><?xml version="1.0" encoding="utf-8"?>
+<p:sld xmlns:a="http://schemas.openxmlformats.org/drawingml/2006/main" xmlns:r="http://schemas.openxmlformats.org/officeDocument/2006/relationships" xmlns:p="http://schemas.openxmlformats.org/presentationml/2006/main">
+  <p:cSld>
+    <p:spTree>
+      <p:nvGrpSpPr>
+        <p:cNvPr id="1" name=""/>
+        <p:cNvGrpSpPr/>
+        <p:nvPr/>
+      </p:nvGrpSpPr>
+      <p:grpSpPr>
+        <a:xfrm>
+          <a:off x="0" y="0"/>
+          <a:ext cx="0" cy="0"/>
+          <a:chOff x="0" y="0"/>
+          <a:chExt cx="0" cy="0"/>
+        </a:xfrm>
+      </p:grpSpPr>
+      <p:sp>
+        <p:nvSpPr>
+          <p:cNvPr id="2" name="Title 1">
+            <a:extLst>
+              <a:ext uri="{FF2B5EF4-FFF2-40B4-BE49-F238E27FC236}">
+                <a16:creationId xmlns:a16="http://schemas.microsoft.com/office/drawing/2014/main" id="{74B4A9B9-347D-9138-A2BB-04730F084DF1}"/>
+              </a:ext>
+            </a:extLst>
+          </p:cNvPr>
+          <p:cNvSpPr>
+            <a:spLocks noGrp="1"/>
+          </p:cNvSpPr>
+          <p:nvPr>
+            <p:ph type="title"/>
+          </p:nvPr>
+        </p:nvSpPr>
+        <p:spPr/>
+        <p:txBody>
+          <a:bodyPr/>
+          <a:lstStyle/>
+          <a:p>
+            <a:r>
+              <a:rPr lang="en-US" b="1" dirty="0"/>
+              <a:t>Data Visualization</a:t>
+            </a:r>
+            <a:endParaRPr lang="en-US" dirty="0"/>
+          </a:p>
+        </p:txBody>
+      </p:sp>
+      <p:sp>
+        <p:nvSpPr>
+          <p:cNvPr id="3" name="Content Placeholder 2">
+            <a:extLst>
+              <a:ext uri="{FF2B5EF4-FFF2-40B4-BE49-F238E27FC236}">
+                <a16:creationId xmlns:a16="http://schemas.microsoft.com/office/drawing/2014/main" id="{3CC58DA9-A0B0-D9CD-F34F-F4ACE19C93D1}"/>
+              </a:ext>
+            </a:extLst>
+          </p:cNvPr>
+          <p:cNvSpPr>
+            <a:spLocks noGrp="1"/>
+          </p:cNvSpPr>
+          <p:nvPr>
+            <p:ph idx="1"/>
+          </p:nvPr>
+        </p:nvSpPr>
+        <p:spPr/>
+        <p:txBody>
+          <a:bodyPr/>
+          <a:lstStyle/>
+          <a:p>
+            <a:pPr marL="514350" indent="-514350">
+              <a:buFont typeface="+mj-lt"/>
+              <a:buAutoNum type="arabicPeriod"/>
+            </a:pPr>
+            <a:r>
+              <a:rPr lang="en-US" b="1" dirty="0"/>
+              <a:t>Line Graphs</a:t>
+            </a:r>
+            <a:endParaRPr lang="en-US" dirty="0"/>
+          </a:p>
+          <a:p>
+            <a:pPr lvl="1"/>
+            <a:r>
+              <a:rPr lang="en-US" dirty="0"/>
+              <a:t>Comparison of pollutants (</a:t>
+            </a:r>
+            <a:r>
+              <a:rPr lang="en-US" dirty="0" err="1"/>
+              <a:t>PM2.5</a:t>
+            </a:r>
+            <a:r>
+              <a:rPr lang="en-US" dirty="0"/>
+              <a:t>, CO2, VOC, etc.) across time.</a:t>
+            </a:r>
+          </a:p>
+          <a:p>
+            <a:pPr marL="514350" indent="-514350">
+              <a:buFont typeface="+mj-lt"/>
+              <a:buAutoNum type="arabicPeriod"/>
+            </a:pPr>
+            <a:r>
+              <a:rPr lang="en-US" b="1" dirty="0"/>
+              <a:t>Air Quality Status Circle</a:t>
+            </a:r>
+            <a:endParaRPr lang="en-US" dirty="0"/>
+          </a:p>
+          <a:p>
+            <a:pPr lvl="1"/>
+            <a:r>
+              <a:rPr lang="en-US" dirty="0"/>
+              <a:t>Dynamic color changes based on air quality status.</a:t>
+            </a:r>
+          </a:p>
+          <a:p>
+            <a:pPr marL="514350" indent="-514350">
+              <a:buFont typeface="+mj-lt"/>
+              <a:buAutoNum type="arabicPeriod"/>
+            </a:pPr>
+            <a:r>
+              <a:rPr lang="en-US" b="1" dirty="0"/>
+              <a:t>Statistics Display</a:t>
+            </a:r>
+            <a:endParaRPr lang="en-US" dirty="0"/>
+          </a:p>
+          <a:p>
+            <a:pPr lvl="1"/>
+            <a:r>
+              <a:rPr lang="en-US" dirty="0"/>
+              <a:t>Detailed pollutant levels for specific areas.</a:t>
+            </a:r>
+          </a:p>
+          <a:p>
+            <a:endParaRPr lang="en-US" dirty="0"/>
+          </a:p>
+        </p:txBody>
+      </p:sp>
+    </p:spTree>
+    <p:extLst>
+      <p:ext uri="{BB962C8B-B14F-4D97-AF65-F5344CB8AC3E}">
+        <p14:creationId xmlns:p14="http://schemas.microsoft.com/office/powerpoint/2010/main" val="3152213304"/>
+      </p:ext>
+    </p:extLst>
+  </p:cSld>
+  <p:clrMapOvr>
+    <a:masterClrMapping/>
+  </p:clrMapOvr>
+</p:sld>
+</file>
+
+<file path=ppt/slides/slide6.xml><?xml version="1.0" encoding="utf-8"?>
 <p:sld xmlns:a="http://schemas.openxmlformats.org/drawingml/2006/main" xmlns:r="http://schemas.openxmlformats.org/officeDocument/2006/relationships" xmlns:p="http://schemas.openxmlformats.org/presentationml/2006/main">
   <p:cSld>
     <p:spTree>
@@ -4326,7 +4931,7 @@
 </p:sld>
 </file>
 
-<file path=ppt/slides/slide5.xml><?xml version="1.0" encoding="utf-8"?>
+<file path=ppt/slides/slide7.xml><?xml version="1.0" encoding="utf-8"?>
 <p:sld xmlns:a="http://schemas.openxmlformats.org/drawingml/2006/main" xmlns:r="http://schemas.openxmlformats.org/officeDocument/2006/relationships" xmlns:p="http://schemas.openxmlformats.org/presentationml/2006/main">
   <p:cSld>
     <p:spTree>
@@ -4440,7 +5045,7 @@
             </a:pPr>
             <a:r>
               <a:rPr lang="en-US" dirty="0"/>
-              <a:t>Add animations and better styling for data transitions.</a:t>
+              <a:t>Add animations and more intuitive user experiences.</a:t>
             </a:r>
           </a:p>
           <a:p>
@@ -4559,6 +5164,108 @@
     <p:extLst>
       <p:ext uri="{BB962C8B-B14F-4D97-AF65-F5344CB8AC3E}">
         <p14:creationId xmlns:p14="http://schemas.microsoft.com/office/powerpoint/2010/main" val="1213082233"/>
+      </p:ext>
+    </p:extLst>
+  </p:cSld>
+  <p:clrMapOvr>
+    <a:masterClrMapping/>
+  </p:clrMapOvr>
+</p:sld>
+</file>
+
+<file path=ppt/slides/slide8.xml><?xml version="1.0" encoding="utf-8"?>
+<p:sld xmlns:a="http://schemas.openxmlformats.org/drawingml/2006/main" xmlns:r="http://schemas.openxmlformats.org/officeDocument/2006/relationships" xmlns:p="http://schemas.openxmlformats.org/presentationml/2006/main">
+  <p:cSld>
+    <p:spTree>
+      <p:nvGrpSpPr>
+        <p:cNvPr id="1" name=""/>
+        <p:cNvGrpSpPr/>
+        <p:nvPr/>
+      </p:nvGrpSpPr>
+      <p:grpSpPr>
+        <a:xfrm>
+          <a:off x="0" y="0"/>
+          <a:ext cx="0" cy="0"/>
+          <a:chOff x="0" y="0"/>
+          <a:chExt cx="0" cy="0"/>
+        </a:xfrm>
+      </p:grpSpPr>
+      <p:sp>
+        <p:nvSpPr>
+          <p:cNvPr id="2" name="TextBox 1">
+            <a:extLst>
+              <a:ext uri="{FF2B5EF4-FFF2-40B4-BE49-F238E27FC236}">
+                <a16:creationId xmlns:a16="http://schemas.microsoft.com/office/drawing/2014/main" id="{266C8AB2-00D0-2284-1A07-07B9CD1CF40F}"/>
+              </a:ext>
+            </a:extLst>
+          </p:cNvPr>
+          <p:cNvSpPr txBox="1"/>
+          <p:nvPr/>
+        </p:nvSpPr>
+        <p:spPr>
+          <a:xfrm>
+            <a:off x="845127" y="1136073"/>
+            <a:ext cx="6899564" cy="369332"/>
+          </a:xfrm>
+          <a:prstGeom prst="rect">
+            <a:avLst/>
+          </a:prstGeom>
+          <a:noFill/>
+        </p:spPr>
+        <p:txBody>
+          <a:bodyPr wrap="square" rtlCol="0">
+            <a:spAutoFit/>
+          </a:bodyPr>
+          <a:lstStyle/>
+          <a:p>
+            <a:r>
+              <a:rPr lang="en-US" b="1" i="0" u="sng" dirty="0">
+                <a:effectLst/>
+                <a:latin typeface="-apple-system"/>
+                <a:hlinkClick r:id="rId2"/>
+              </a:rPr>
+              <a:t>https://</a:t>
+            </a:r>
+            <a:r>
+              <a:rPr lang="en-US" b="1" i="0" u="sng" dirty="0" err="1">
+                <a:effectLst/>
+                <a:latin typeface="-apple-system"/>
+                <a:hlinkClick r:id="rId2"/>
+              </a:rPr>
+              <a:t>tunmyintmokhaung.github.io</a:t>
+            </a:r>
+            <a:r>
+              <a:rPr lang="en-US" b="1" i="0" u="sng" dirty="0">
+                <a:effectLst/>
+                <a:latin typeface="-apple-system"/>
+                <a:hlinkClick r:id="rId2"/>
+              </a:rPr>
+              <a:t>/</a:t>
+            </a:r>
+            <a:r>
+              <a:rPr lang="en-US" b="1" i="0" u="sng" dirty="0" err="1">
+                <a:effectLst/>
+                <a:latin typeface="-apple-system"/>
+                <a:hlinkClick r:id="rId2"/>
+              </a:rPr>
+              <a:t>web_design</a:t>
+            </a:r>
+            <a:r>
+              <a:rPr lang="en-US" b="1" i="0" u="sng" dirty="0">
+                <a:effectLst/>
+                <a:latin typeface="-apple-system"/>
+                <a:hlinkClick r:id="rId2"/>
+              </a:rPr>
+              <a:t>/</a:t>
+            </a:r>
+            <a:endParaRPr lang="en-US" dirty="0"/>
+          </a:p>
+        </p:txBody>
+      </p:sp>
+    </p:spTree>
+    <p:extLst>
+      <p:ext uri="{BB962C8B-B14F-4D97-AF65-F5344CB8AC3E}">
+        <p14:creationId xmlns:p14="http://schemas.microsoft.com/office/powerpoint/2010/main" val="595890786"/>
       </p:ext>
     </p:extLst>
   </p:cSld>

</xml_diff>